<commit_message>
update SJT r script
</commit_message>
<xml_diff>
--- a/01_studies/01_Laborstudie ProVisioNET/Akquise/ProVisioNET_Poster_Lehrpersonen.pptx
+++ b/01_studies/01_Laborstudie ProVisioNET/Akquise/ProVisioNET_Poster_Lehrpersonen.pptx
@@ -133,6 +133,43 @@
 </p:cmAuthorLst>
 </file>
 
+<file path=ppt/changesInfos/changesInfo1.xml><?xml version="1.0" encoding="utf-8"?>
+<pc:chgInfo xmlns:a="http://schemas.openxmlformats.org/drawingml/2006/main" xmlns:r="http://schemas.openxmlformats.org/officeDocument/2006/relationships" xmlns:ac="http://schemas.microsoft.com/office/drawing/2013/main/command" xmlns:pc="http://schemas.microsoft.com/office/powerpoint/2013/main/command">
+  <pc:docChgLst>
+    <pc:chgData userId="505858402c07da9d" providerId="LiveId" clId="{354B7354-4897-4BD4-96C4-997F16420CC8}"/>
+    <pc:docChg chg="modSld">
+      <pc:chgData name="" userId="505858402c07da9d" providerId="LiveId" clId="{354B7354-4897-4BD4-96C4-997F16420CC8}" dt="2022-01-28T10:19:08.055" v="2" actId="113"/>
+      <pc:docMkLst>
+        <pc:docMk/>
+      </pc:docMkLst>
+      <pc:sldChg chg="modSp">
+        <pc:chgData name="" userId="505858402c07da9d" providerId="LiveId" clId="{354B7354-4897-4BD4-96C4-997F16420CC8}" dt="2022-01-28T10:19:08.055" v="2" actId="113"/>
+        <pc:sldMkLst>
+          <pc:docMk/>
+          <pc:sldMk cId="226598215" sldId="261"/>
+        </pc:sldMkLst>
+        <pc:spChg chg="mod">
+          <ac:chgData name="" userId="505858402c07da9d" providerId="LiveId" clId="{354B7354-4897-4BD4-96C4-997F16420CC8}" dt="2022-01-28T10:19:08.055" v="2" actId="113"/>
+          <ac:spMkLst>
+            <pc:docMk/>
+            <pc:sldMk cId="226598215" sldId="261"/>
+            <ac:spMk id="2" creationId="{00000000-0000-0000-0000-000000000000}"/>
+          </ac:spMkLst>
+        </pc:spChg>
+        <pc:spChg chg="mod">
+          <ac:chgData name="" userId="505858402c07da9d" providerId="LiveId" clId="{354B7354-4897-4BD4-96C4-997F16420CC8}" dt="2022-01-27T10:25:12.718" v="1" actId="20577"/>
+          <ac:spMkLst>
+            <pc:docMk/>
+            <pc:sldMk cId="226598215" sldId="261"/>
+            <ac:spMk id="18" creationId="{7C6BBA8F-C99A-452C-83E3-7A79D8EE45F8}"/>
+          </ac:spMkLst>
+        </pc:spChg>
+      </pc:sldChg>
+    </pc:docChg>
+  </pc:docChgLst>
+</pc:chgInfo>
+</file>
+
 <file path=ppt/handoutMasters/handoutMaster1.xml><?xml version="1.0" encoding="utf-8"?>
 <p:handoutMaster xmlns:a="http://schemas.openxmlformats.org/drawingml/2006/main" xmlns:r="http://schemas.openxmlformats.org/officeDocument/2006/relationships" xmlns:p="http://schemas.openxmlformats.org/presentationml/2006/main">
   <p:cSld>
@@ -227,7 +264,7 @@
           <a:p>
             <a:fld id="{79037448-365F-4BC4-9AAC-969B1DF37587}" type="datetimeFigureOut">
               <a:rPr lang="de-DE" smtClean="0"/>
-              <a:t>17.01.2022</a:t>
+              <a:t>28.01.2022</a:t>
             </a:fld>
             <a:endParaRPr lang="de-DE"/>
           </a:p>
@@ -404,7 +441,7 @@
           <a:p>
             <a:fld id="{C300DDCA-42E4-48B0-9B7B-FE02D25AD1C8}" type="datetimeFigureOut">
               <a:rPr lang="de-DE" smtClean="0"/>
-              <a:t>17.01.2022</a:t>
+              <a:t>28.01.2022</a:t>
             </a:fld>
             <a:endParaRPr lang="de-DE"/>
           </a:p>
@@ -2375,11 +2412,7 @@
             </a:r>
             <a:r>
               <a:rPr lang="de-DE" sz="1600" b="1" cap="small" dirty="0"/>
-              <a:t>Visi</a:t>
-            </a:r>
-            <a:r>
-              <a:rPr lang="de-DE" sz="1600" cap="small" dirty="0"/>
-              <a:t>o</a:t>
+              <a:t>Visio</a:t>
             </a:r>
             <a:r>
               <a:rPr lang="de-DE" sz="1600" b="0" cap="small" dirty="0"/>
@@ -4470,7 +4503,7 @@
               <a:rPr lang="de-DE" sz="2400" dirty="0">
                 <a:latin typeface="+mj-lt"/>
               </a:rPr>
-              <a:t>Sie sind Lehrkraft &amp; haben Lust, in einem entspannten Unterrichtssetting persönliches Feedback zu Ihrem Blick- &amp; Verhaltensmustern zu bekommen? Dann seien Sie dabei!</a:t>
+              <a:t>Sie sind Lehrkraft &amp; haben Lust, in einem entspannten Unterrichtssetting persönliches Feedback zu Ihren Blick- &amp; Verhaltensmustern zu bekommen? Dann seien Sie dabei!</a:t>
             </a:r>
           </a:p>
         </p:txBody>

</xml_diff>